<commit_message>
implemented review comments in skeletonization module #332
</commit_message>
<xml_diff>
--- a/figures/resources/skeletonization.pptx
+++ b/figures/resources/skeletonization.pptx
@@ -104,6 +104,11 @@
       </a:defRPr>
     </a:lvl9pPr>
   </p:defaultTextStyle>
+  <p:extLst>
+    <p:ext uri="{EFAFB233-063F-42B5-8137-9DF3F51BA10A}">
+      <p15:sldGuideLst xmlns:p15="http://schemas.microsoft.com/office/powerpoint/2012/main"/>
+    </p:ext>
+  </p:extLst>
 </p:presentation>
 </file>
 
@@ -250,7 +255,7 @@
           <a:p>
             <a:fld id="{D828119C-ECF2-4E5F-B533-B79D22A28DB3}" type="datetimeFigureOut">
               <a:rPr lang="en-US" smtClean="0"/>
-              <a:t>3/2/2022</a:t>
+              <a:t>3/11/2022</a:t>
             </a:fld>
             <a:endParaRPr lang="en-US"/>
           </a:p>
@@ -420,7 +425,7 @@
           <a:p>
             <a:fld id="{D828119C-ECF2-4E5F-B533-B79D22A28DB3}" type="datetimeFigureOut">
               <a:rPr lang="en-US" smtClean="0"/>
-              <a:t>3/2/2022</a:t>
+              <a:t>3/11/2022</a:t>
             </a:fld>
             <a:endParaRPr lang="en-US"/>
           </a:p>
@@ -600,7 +605,7 @@
           <a:p>
             <a:fld id="{D828119C-ECF2-4E5F-B533-B79D22A28DB3}" type="datetimeFigureOut">
               <a:rPr lang="en-US" smtClean="0"/>
-              <a:t>3/2/2022</a:t>
+              <a:t>3/11/2022</a:t>
             </a:fld>
             <a:endParaRPr lang="en-US"/>
           </a:p>
@@ -770,7 +775,7 @@
           <a:p>
             <a:fld id="{D828119C-ECF2-4E5F-B533-B79D22A28DB3}" type="datetimeFigureOut">
               <a:rPr lang="en-US" smtClean="0"/>
-              <a:t>3/2/2022</a:t>
+              <a:t>3/11/2022</a:t>
             </a:fld>
             <a:endParaRPr lang="en-US"/>
           </a:p>
@@ -1016,7 +1021,7 @@
           <a:p>
             <a:fld id="{D828119C-ECF2-4E5F-B533-B79D22A28DB3}" type="datetimeFigureOut">
               <a:rPr lang="en-US" smtClean="0"/>
-              <a:t>3/2/2022</a:t>
+              <a:t>3/11/2022</a:t>
             </a:fld>
             <a:endParaRPr lang="en-US"/>
           </a:p>
@@ -1248,7 +1253,7 @@
           <a:p>
             <a:fld id="{D828119C-ECF2-4E5F-B533-B79D22A28DB3}" type="datetimeFigureOut">
               <a:rPr lang="en-US" smtClean="0"/>
-              <a:t>3/2/2022</a:t>
+              <a:t>3/11/2022</a:t>
             </a:fld>
             <a:endParaRPr lang="en-US"/>
           </a:p>
@@ -1615,7 +1620,7 @@
           <a:p>
             <a:fld id="{D828119C-ECF2-4E5F-B533-B79D22A28DB3}" type="datetimeFigureOut">
               <a:rPr lang="en-US" smtClean="0"/>
-              <a:t>3/2/2022</a:t>
+              <a:t>3/11/2022</a:t>
             </a:fld>
             <a:endParaRPr lang="en-US"/>
           </a:p>
@@ -1733,7 +1738,7 @@
           <a:p>
             <a:fld id="{D828119C-ECF2-4E5F-B533-B79D22A28DB3}" type="datetimeFigureOut">
               <a:rPr lang="en-US" smtClean="0"/>
-              <a:t>3/2/2022</a:t>
+              <a:t>3/11/2022</a:t>
             </a:fld>
             <a:endParaRPr lang="en-US"/>
           </a:p>
@@ -1828,7 +1833,7 @@
           <a:p>
             <a:fld id="{D828119C-ECF2-4E5F-B533-B79D22A28DB3}" type="datetimeFigureOut">
               <a:rPr lang="en-US" smtClean="0"/>
-              <a:t>3/2/2022</a:t>
+              <a:t>3/11/2022</a:t>
             </a:fld>
             <a:endParaRPr lang="en-US"/>
           </a:p>
@@ -2105,7 +2110,7 @@
           <a:p>
             <a:fld id="{D828119C-ECF2-4E5F-B533-B79D22A28DB3}" type="datetimeFigureOut">
               <a:rPr lang="en-US" smtClean="0"/>
-              <a:t>3/2/2022</a:t>
+              <a:t>3/11/2022</a:t>
             </a:fld>
             <a:endParaRPr lang="en-US"/>
           </a:p>
@@ -2362,7 +2367,7 @@
           <a:p>
             <a:fld id="{D828119C-ECF2-4E5F-B533-B79D22A28DB3}" type="datetimeFigureOut">
               <a:rPr lang="en-US" smtClean="0"/>
-              <a:t>3/2/2022</a:t>
+              <a:t>3/11/2022</a:t>
             </a:fld>
             <a:endParaRPr lang="en-US"/>
           </a:p>
@@ -2575,7 +2580,7 @@
           <a:p>
             <a:fld id="{D828119C-ECF2-4E5F-B533-B79D22A28DB3}" type="datetimeFigureOut">
               <a:rPr lang="en-US" smtClean="0"/>
-              <a:t>3/2/2022</a:t>
+              <a:t>3/11/2022</a:t>
             </a:fld>
             <a:endParaRPr lang="en-US"/>
           </a:p>
@@ -3151,132 +3156,6 @@
           </a:fontRef>
         </p:style>
       </p:cxnSp>
-      <p:sp>
-        <p:nvSpPr>
-          <p:cNvPr id="13" name="TextBox 12"/>
-          <p:cNvSpPr txBox="1"/>
-          <p:nvPr/>
-        </p:nvSpPr>
-        <p:spPr>
-          <a:xfrm>
-            <a:off x="475491" y="619468"/>
-            <a:ext cx="1020216" cy="319190"/>
-          </a:xfrm>
-          <a:prstGeom prst="rect">
-            <a:avLst/>
-          </a:prstGeom>
-          <a:noFill/>
-        </p:spPr>
-        <p:txBody>
-          <a:bodyPr wrap="none" rtlCol="0">
-            <a:spAutoFit/>
-          </a:bodyPr>
-          <a:lstStyle/>
-          <a:p>
-            <a:r>
-              <a:rPr lang="nl-NL" sz="1474" dirty="0"/>
-              <a:t>Raw image</a:t>
-            </a:r>
-            <a:endParaRPr lang="en-US" sz="1474" dirty="0"/>
-          </a:p>
-        </p:txBody>
-      </p:sp>
-      <p:sp>
-        <p:nvSpPr>
-          <p:cNvPr id="14" name="TextBox 13"/>
-          <p:cNvSpPr txBox="1"/>
-          <p:nvPr/>
-        </p:nvSpPr>
-        <p:spPr>
-          <a:xfrm>
-            <a:off x="3086200" y="506041"/>
-            <a:ext cx="1341073" cy="546047"/>
-          </a:xfrm>
-          <a:prstGeom prst="rect">
-            <a:avLst/>
-          </a:prstGeom>
-          <a:noFill/>
-        </p:spPr>
-        <p:txBody>
-          <a:bodyPr wrap="none" rtlCol="0">
-            <a:spAutoFit/>
-          </a:bodyPr>
-          <a:lstStyle/>
-          <a:p>
-            <a:r>
-              <a:rPr lang="nl-NL" sz="1474" dirty="0"/>
-              <a:t>Segmentation, </a:t>
-            </a:r>
-          </a:p>
-          <a:p>
-            <a:r>
-              <a:rPr lang="nl-NL" sz="1474" dirty="0"/>
-              <a:t>label selection</a:t>
-            </a:r>
-            <a:endParaRPr lang="en-US" sz="1474" dirty="0"/>
-          </a:p>
-        </p:txBody>
-      </p:sp>
-      <p:sp>
-        <p:nvSpPr>
-          <p:cNvPr id="15" name="TextBox 14"/>
-          <p:cNvSpPr txBox="1"/>
-          <p:nvPr/>
-        </p:nvSpPr>
-        <p:spPr>
-          <a:xfrm>
-            <a:off x="5852561" y="619468"/>
-            <a:ext cx="1350626" cy="319190"/>
-          </a:xfrm>
-          <a:prstGeom prst="rect">
-            <a:avLst/>
-          </a:prstGeom>
-          <a:noFill/>
-        </p:spPr>
-        <p:txBody>
-          <a:bodyPr wrap="none" rtlCol="0">
-            <a:spAutoFit/>
-          </a:bodyPr>
-          <a:lstStyle/>
-          <a:p>
-            <a:r>
-              <a:rPr lang="nl-NL" sz="1474" dirty="0"/>
-              <a:t>Skeletonization</a:t>
-            </a:r>
-            <a:endParaRPr lang="en-US" sz="1474" dirty="0"/>
-          </a:p>
-        </p:txBody>
-      </p:sp>
-      <p:sp>
-        <p:nvSpPr>
-          <p:cNvPr id="16" name="TextBox 15"/>
-          <p:cNvSpPr txBox="1"/>
-          <p:nvPr/>
-        </p:nvSpPr>
-        <p:spPr>
-          <a:xfrm>
-            <a:off x="8558006" y="619468"/>
-            <a:ext cx="1482009" cy="319190"/>
-          </a:xfrm>
-          <a:prstGeom prst="rect">
-            <a:avLst/>
-          </a:prstGeom>
-          <a:noFill/>
-        </p:spPr>
-        <p:txBody>
-          <a:bodyPr wrap="none" rtlCol="0">
-            <a:spAutoFit/>
-          </a:bodyPr>
-          <a:lstStyle/>
-          <a:p>
-            <a:r>
-              <a:rPr lang="nl-NL" sz="1474" dirty="0"/>
-              <a:t>Skeleton analysis</a:t>
-            </a:r>
-            <a:endParaRPr lang="en-US" sz="1474" dirty="0"/>
-          </a:p>
-        </p:txBody>
-      </p:sp>
       <p:pic>
         <p:nvPicPr>
           <p:cNvPr id="17" name="Picture 16"/>
@@ -3286,7 +3165,19 @@
           <p:nvPr/>
         </p:nvPicPr>
         <p:blipFill>
-          <a:blip r:embed="rId5"/>
+          <a:blip r:embed="rId5">
+            <a:extLst>
+              <a:ext uri="{BEBA8EAE-BF5A-486C-A8C5-ECC9F3942E4B}">
+                <a14:imgProps xmlns:a14="http://schemas.microsoft.com/office/drawing/2010/main">
+                  <a14:imgLayer r:embed="rId6">
+                    <a14:imgEffect>
+                      <a14:brightnessContrast bright="40000" contrast="40000"/>
+                    </a14:imgEffect>
+                  </a14:imgLayer>
+                </a14:imgProps>
+              </a:ext>
+            </a:extLst>
+          </a:blip>
           <a:stretch>
             <a:fillRect/>
           </a:stretch>
@@ -3301,6 +3192,234 @@
           </a:prstGeom>
         </p:spPr>
       </p:pic>
+      <p:sp>
+        <p:nvSpPr>
+          <p:cNvPr id="2" name="TextBox 1"/>
+          <p:cNvSpPr txBox="1"/>
+          <p:nvPr/>
+        </p:nvSpPr>
+        <p:spPr>
+          <a:xfrm>
+            <a:off x="-65150" y="910920"/>
+            <a:ext cx="341728" cy="400110"/>
+          </a:xfrm>
+          <a:prstGeom prst="rect">
+            <a:avLst/>
+          </a:prstGeom>
+          <a:noFill/>
+        </p:spPr>
+        <p:txBody>
+          <a:bodyPr wrap="square" rtlCol="0">
+            <a:spAutoFit/>
+          </a:bodyPr>
+          <a:lstStyle/>
+          <a:p>
+            <a:r>
+              <a:rPr lang="nl-NL" sz="2000" dirty="0" smtClean="0"/>
+              <a:t>a</a:t>
+            </a:r>
+            <a:endParaRPr lang="en-US" dirty="0"/>
+          </a:p>
+        </p:txBody>
+      </p:sp>
+      <p:sp>
+        <p:nvSpPr>
+          <p:cNvPr id="18" name="TextBox 17"/>
+          <p:cNvSpPr txBox="1"/>
+          <p:nvPr/>
+        </p:nvSpPr>
+        <p:spPr>
+          <a:xfrm>
+            <a:off x="2832176" y="910920"/>
+            <a:ext cx="341728" cy="400110"/>
+          </a:xfrm>
+          <a:prstGeom prst="rect">
+            <a:avLst/>
+          </a:prstGeom>
+          <a:noFill/>
+        </p:spPr>
+        <p:txBody>
+          <a:bodyPr wrap="square" rtlCol="0">
+            <a:spAutoFit/>
+          </a:bodyPr>
+          <a:lstStyle/>
+          <a:p>
+            <a:r>
+              <a:rPr lang="nl-NL" sz="2000" dirty="0" smtClean="0"/>
+              <a:t>b</a:t>
+            </a:r>
+            <a:endParaRPr lang="en-US" dirty="0"/>
+          </a:p>
+        </p:txBody>
+      </p:sp>
+      <p:sp>
+        <p:nvSpPr>
+          <p:cNvPr id="19" name="TextBox 18"/>
+          <p:cNvSpPr txBox="1"/>
+          <p:nvPr/>
+        </p:nvSpPr>
+        <p:spPr>
+          <a:xfrm>
+            <a:off x="5729502" y="910920"/>
+            <a:ext cx="341728" cy="400110"/>
+          </a:xfrm>
+          <a:prstGeom prst="rect">
+            <a:avLst/>
+          </a:prstGeom>
+          <a:noFill/>
+        </p:spPr>
+        <p:txBody>
+          <a:bodyPr wrap="square" rtlCol="0">
+            <a:spAutoFit/>
+          </a:bodyPr>
+          <a:lstStyle/>
+          <a:p>
+            <a:r>
+              <a:rPr lang="nl-NL" sz="2000" dirty="0" smtClean="0"/>
+              <a:t>c</a:t>
+            </a:r>
+            <a:endParaRPr lang="en-US" dirty="0"/>
+          </a:p>
+        </p:txBody>
+      </p:sp>
+      <p:sp>
+        <p:nvSpPr>
+          <p:cNvPr id="20" name="TextBox 19"/>
+          <p:cNvSpPr txBox="1"/>
+          <p:nvPr/>
+        </p:nvSpPr>
+        <p:spPr>
+          <a:xfrm>
+            <a:off x="8271619" y="910920"/>
+            <a:ext cx="341728" cy="400110"/>
+          </a:xfrm>
+          <a:prstGeom prst="rect">
+            <a:avLst/>
+          </a:prstGeom>
+          <a:noFill/>
+        </p:spPr>
+        <p:txBody>
+          <a:bodyPr wrap="square" rtlCol="0">
+            <a:spAutoFit/>
+          </a:bodyPr>
+          <a:lstStyle/>
+          <a:p>
+            <a:r>
+              <a:rPr lang="nl-NL" sz="2000" dirty="0" smtClean="0"/>
+              <a:t>d</a:t>
+            </a:r>
+            <a:endParaRPr lang="en-US" dirty="0"/>
+          </a:p>
+        </p:txBody>
+      </p:sp>
+      <p:cxnSp>
+        <p:nvCxnSpPr>
+          <p:cNvPr id="7" name="Straight Arrow Connector 6"/>
+          <p:cNvCxnSpPr/>
+          <p:nvPr/>
+        </p:nvCxnSpPr>
+        <p:spPr>
+          <a:xfrm flipH="1">
+            <a:off x="9077677" y="1333608"/>
+            <a:ext cx="145345" cy="252481"/>
+          </a:xfrm>
+          <a:prstGeom prst="straightConnector1">
+            <a:avLst/>
+          </a:prstGeom>
+          <a:ln>
+            <a:solidFill>
+              <a:srgbClr val="FFD8FF"/>
+            </a:solidFill>
+            <a:tailEnd type="triangle"/>
+          </a:ln>
+        </p:spPr>
+        <p:style>
+          <a:lnRef idx="1">
+            <a:schemeClr val="accent3"/>
+          </a:lnRef>
+          <a:fillRef idx="0">
+            <a:schemeClr val="accent3"/>
+          </a:fillRef>
+          <a:effectRef idx="0">
+            <a:schemeClr val="accent3"/>
+          </a:effectRef>
+          <a:fontRef idx="minor">
+            <a:schemeClr val="tx1"/>
+          </a:fontRef>
+        </p:style>
+      </p:cxnSp>
+      <p:cxnSp>
+        <p:nvCxnSpPr>
+          <p:cNvPr id="22" name="Straight Arrow Connector 21"/>
+          <p:cNvCxnSpPr/>
+          <p:nvPr/>
+        </p:nvCxnSpPr>
+        <p:spPr>
+          <a:xfrm flipH="1">
+            <a:off x="9257170" y="1689208"/>
+            <a:ext cx="145345" cy="252481"/>
+          </a:xfrm>
+          <a:prstGeom prst="straightConnector1">
+            <a:avLst/>
+          </a:prstGeom>
+          <a:ln>
+            <a:solidFill>
+              <a:srgbClr val="5B2DAF"/>
+            </a:solidFill>
+            <a:tailEnd type="triangle"/>
+          </a:ln>
+        </p:spPr>
+        <p:style>
+          <a:lnRef idx="1">
+            <a:schemeClr val="accent3"/>
+          </a:lnRef>
+          <a:fillRef idx="0">
+            <a:schemeClr val="accent3"/>
+          </a:fillRef>
+          <a:effectRef idx="0">
+            <a:schemeClr val="accent3"/>
+          </a:effectRef>
+          <a:fontRef idx="minor">
+            <a:schemeClr val="tx1"/>
+          </a:fontRef>
+        </p:style>
+      </p:cxnSp>
+      <p:cxnSp>
+        <p:nvCxnSpPr>
+          <p:cNvPr id="23" name="Straight Arrow Connector 22"/>
+          <p:cNvCxnSpPr/>
+          <p:nvPr/>
+        </p:nvCxnSpPr>
+        <p:spPr>
+          <a:xfrm flipH="1">
+            <a:off x="8959143" y="2068515"/>
+            <a:ext cx="145345" cy="252481"/>
+          </a:xfrm>
+          <a:prstGeom prst="straightConnector1">
+            <a:avLst/>
+          </a:prstGeom>
+          <a:ln>
+            <a:solidFill>
+              <a:srgbClr val="00FFD9"/>
+            </a:solidFill>
+            <a:tailEnd type="triangle"/>
+          </a:ln>
+        </p:spPr>
+        <p:style>
+          <a:lnRef idx="1">
+            <a:schemeClr val="accent3"/>
+          </a:lnRef>
+          <a:fillRef idx="0">
+            <a:schemeClr val="accent3"/>
+          </a:fillRef>
+          <a:effectRef idx="0">
+            <a:schemeClr val="accent3"/>
+          </a:effectRef>
+          <a:fontRef idx="minor">
+            <a:schemeClr val="tx1"/>
+          </a:fontRef>
+        </p:style>
+      </p:cxnSp>
     </p:spTree>
     <p:extLst>
       <p:ext uri="{BB962C8B-B14F-4D97-AF65-F5344CB8AC3E}">

</xml_diff>